<commit_message>
updated slide according to Thierry comments
</commit_message>
<xml_diff>
--- a/semaine3/CO12AL-W3-VIDEO04-SLIDE01.pptx
+++ b/semaine3/CO12AL-W3-VIDEO04-SLIDE01.pptx
@@ -4906,9 +4906,6 @@
               </a:rPr>
               <a:t>objets</a:t>
             </a:r>
-            <a:endParaRPr lang="fr-FR" sz="5400" dirty="0">
-              <a:latin typeface="Calibri" panose="020F0502020204030204" pitchFamily="34" charset="0"/>
-            </a:endParaRPr>
           </a:p>
         </p:txBody>
       </p:sp>
@@ -4984,9 +4981,6 @@
               </a:rPr>
               <a:t>variables</a:t>
             </a:r>
-            <a:endParaRPr lang="fr-FR" sz="5400" dirty="0">
-              <a:latin typeface="Calibri" panose="020F0502020204030204" pitchFamily="34" charset="0"/>
-            </a:endParaRPr>
           </a:p>
         </p:txBody>
       </p:sp>
@@ -5065,9 +5059,6 @@
               </a:rPr>
               <a:t>3</a:t>
             </a:r>
-            <a:endParaRPr lang="fr-FR" sz="5400" dirty="0">
-              <a:latin typeface="Calibri" panose="020F0502020204030204" pitchFamily="34" charset="0"/>
-            </a:endParaRPr>
           </a:p>
         </p:txBody>
       </p:sp>
@@ -5099,9 +5090,6 @@
               </a:rPr>
               <a:t>a</a:t>
             </a:r>
-            <a:endParaRPr lang="fr-FR" sz="5400" dirty="0">
-              <a:latin typeface="Calibri" panose="020F0502020204030204" pitchFamily="34" charset="0"/>
-            </a:endParaRPr>
           </a:p>
         </p:txBody>
       </p:sp>
@@ -5371,12 +5359,6 @@
               </a:rPr>
               <a:t>X</a:t>
             </a:r>
-            <a:endParaRPr lang="fr-FR" sz="5400" dirty="0">
-              <a:solidFill>
-                <a:srgbClr val="FF0000"/>
-              </a:solidFill>
-              <a:latin typeface="Calibri" panose="020F0502020204030204" pitchFamily="34" charset="0"/>
-            </a:endParaRPr>
           </a:p>
         </p:txBody>
       </p:sp>
@@ -5494,12 +5476,6 @@
                 </a:rPr>
                 <a:t>1</a:t>
               </a:r>
-              <a:endParaRPr lang="fr-FR" dirty="0">
-                <a:solidFill>
-                  <a:srgbClr val="FF0000"/>
-                </a:solidFill>
-                <a:latin typeface="Calibri" panose="020F0502020204030204" pitchFamily="34" charset="0"/>
-              </a:endParaRPr>
             </a:p>
           </p:txBody>
         </p:sp>
@@ -5629,12 +5605,6 @@
                 </a:rPr>
                 <a:t>1</a:t>
               </a:r>
-              <a:endParaRPr lang="fr-FR" dirty="0">
-                <a:solidFill>
-                  <a:srgbClr val="FF0000"/>
-                </a:solidFill>
-                <a:latin typeface="Calibri" panose="020F0502020204030204" pitchFamily="34" charset="0"/>
-              </a:endParaRPr>
             </a:p>
           </p:txBody>
         </p:sp>
@@ -5794,12 +5764,6 @@
                 </a:rPr>
                 <a:t>0</a:t>
               </a:r>
-              <a:endParaRPr lang="fr-FR" dirty="0">
-                <a:solidFill>
-                  <a:srgbClr val="FF0000"/>
-                </a:solidFill>
-                <a:latin typeface="Calibri" panose="020F0502020204030204" pitchFamily="34" charset="0"/>
-              </a:endParaRPr>
             </a:p>
           </p:txBody>
         </p:sp>
@@ -5889,12 +5853,6 @@
                 </a:rPr>
                 <a:t>0</a:t>
               </a:r>
-              <a:endParaRPr lang="fr-FR" dirty="0">
-                <a:solidFill>
-                  <a:srgbClr val="FF0000"/>
-                </a:solidFill>
-                <a:latin typeface="Calibri" panose="020F0502020204030204" pitchFamily="34" charset="0"/>
-              </a:endParaRPr>
             </a:p>
           </p:txBody>
         </p:sp>
@@ -6956,9 +6914,6 @@
               </a:rPr>
               <a:t>objets</a:t>
             </a:r>
-            <a:endParaRPr lang="fr-FR" sz="5400" dirty="0">
-              <a:latin typeface="Calibri" panose="020F0502020204030204" pitchFamily="34" charset="0"/>
-            </a:endParaRPr>
           </a:p>
         </p:txBody>
       </p:sp>
@@ -7034,9 +6989,6 @@
               </a:rPr>
               <a:t>variables</a:t>
             </a:r>
-            <a:endParaRPr lang="fr-FR" sz="5400" dirty="0">
-              <a:latin typeface="Calibri" panose="020F0502020204030204" pitchFamily="34" charset="0"/>
-            </a:endParaRPr>
           </a:p>
         </p:txBody>
       </p:sp>
@@ -7076,44 +7028,16 @@
                 <a:latin typeface="Courier New" panose="02070309020205020404" pitchFamily="49" charset="0"/>
                 <a:cs typeface="Courier New" panose="02070309020205020404" pitchFamily="49" charset="0"/>
               </a:rPr>
-              <a:t>&gt;&gt;&gt; </a:t>
+              <a:t>&gt;&gt;&gt; b = a</a:t>
             </a:r>
+          </a:p>
+          <a:p>
             <a:r>
               <a:rPr lang="fr-FR" sz="3600" dirty="0">
                 <a:latin typeface="Courier New" panose="02070309020205020404" pitchFamily="49" charset="0"/>
                 <a:cs typeface="Courier New" panose="02070309020205020404" pitchFamily="49" charset="0"/>
               </a:rPr>
-              <a:t>b </a:t>
-            </a:r>
-            <a:r>
-              <a:rPr lang="fr-FR" sz="3600" dirty="0">
-                <a:latin typeface="Courier New" panose="02070309020205020404" pitchFamily="49" charset="0"/>
-                <a:cs typeface="Courier New" panose="02070309020205020404" pitchFamily="49" charset="0"/>
-              </a:rPr>
-              <a:t>= </a:t>
-            </a:r>
-            <a:r>
-              <a:rPr lang="fr-FR" sz="3600" dirty="0">
-                <a:latin typeface="Courier New" panose="02070309020205020404" pitchFamily="49" charset="0"/>
-                <a:cs typeface="Courier New" panose="02070309020205020404" pitchFamily="49" charset="0"/>
-              </a:rPr>
-              <a:t>a</a:t>
-            </a:r>
-          </a:p>
-          <a:p>
-            <a:r>
-              <a:rPr lang="fr-FR" sz="3600" dirty="0">
-                <a:latin typeface="Courier New" panose="02070309020205020404" pitchFamily="49" charset="0"/>
-                <a:cs typeface="Courier New" panose="02070309020205020404" pitchFamily="49" charset="0"/>
-              </a:rPr>
-              <a:t>&gt;&gt;&gt; </a:t>
-            </a:r>
-            <a:r>
-              <a:rPr lang="fr-FR" sz="3600" dirty="0">
-                <a:latin typeface="Courier New" panose="02070309020205020404" pitchFamily="49" charset="0"/>
-                <a:cs typeface="Courier New" panose="02070309020205020404" pitchFamily="49" charset="0"/>
-              </a:rPr>
-              <a:t>a = 'spam'</a:t>
+              <a:t>&gt;&gt;&gt; a = 'spam'</a:t>
             </a:r>
           </a:p>
         </p:txBody>
@@ -7152,9 +7076,6 @@
               </a:rPr>
               <a:t>3</a:t>
             </a:r>
-            <a:endParaRPr lang="fr-FR" sz="5400" dirty="0">
-              <a:latin typeface="Calibri" panose="020F0502020204030204" pitchFamily="34" charset="0"/>
-            </a:endParaRPr>
           </a:p>
         </p:txBody>
       </p:sp>
@@ -7186,9 +7107,6 @@
               </a:rPr>
               <a:t>a</a:t>
             </a:r>
-            <a:endParaRPr lang="fr-FR" sz="5400" dirty="0">
-              <a:latin typeface="Calibri" panose="020F0502020204030204" pitchFamily="34" charset="0"/>
-            </a:endParaRPr>
           </a:p>
         </p:txBody>
       </p:sp>
@@ -7387,12 +7305,6 @@
               </a:rPr>
               <a:t>X</a:t>
             </a:r>
-            <a:endParaRPr lang="fr-FR" sz="5400" dirty="0">
-              <a:solidFill>
-                <a:srgbClr val="FF0000"/>
-              </a:solidFill>
-              <a:latin typeface="Calibri" panose="020F0502020204030204" pitchFamily="34" charset="0"/>
-            </a:endParaRPr>
           </a:p>
         </p:txBody>
       </p:sp>
@@ -7465,9 +7377,6 @@
               </a:rPr>
               <a:t>b</a:t>
             </a:r>
-            <a:endParaRPr lang="fr-FR" sz="5400" dirty="0">
-              <a:latin typeface="Calibri" panose="020F0502020204030204" pitchFamily="34" charset="0"/>
-            </a:endParaRPr>
           </a:p>
         </p:txBody>
       </p:sp>
@@ -7629,12 +7538,6 @@
                 </a:rPr>
                 <a:t>1</a:t>
               </a:r>
-              <a:endParaRPr lang="fr-FR" dirty="0">
-                <a:solidFill>
-                  <a:srgbClr val="FF0000"/>
-                </a:solidFill>
-                <a:latin typeface="Calibri" panose="020F0502020204030204" pitchFamily="34" charset="0"/>
-              </a:endParaRPr>
             </a:p>
           </p:txBody>
         </p:sp>
@@ -7793,12 +7696,6 @@
                 </a:rPr>
                 <a:t>1</a:t>
               </a:r>
-              <a:endParaRPr lang="fr-FR" dirty="0">
-                <a:solidFill>
-                  <a:srgbClr val="FF0000"/>
-                </a:solidFill>
-                <a:latin typeface="Calibri" panose="020F0502020204030204" pitchFamily="34" charset="0"/>
-              </a:endParaRPr>
             </a:p>
           </p:txBody>
         </p:sp>
@@ -7957,12 +7854,6 @@
                 </a:rPr>
                 <a:t>2</a:t>
               </a:r>
-              <a:endParaRPr lang="fr-FR" dirty="0">
-                <a:solidFill>
-                  <a:srgbClr val="FF0000"/>
-                </a:solidFill>
-                <a:latin typeface="Calibri" panose="020F0502020204030204" pitchFamily="34" charset="0"/>
-              </a:endParaRPr>
             </a:p>
           </p:txBody>
         </p:sp>
@@ -8052,12 +7943,6 @@
                 </a:rPr>
                 <a:t>0</a:t>
               </a:r>
-              <a:endParaRPr lang="fr-FR" dirty="0">
-                <a:solidFill>
-                  <a:srgbClr val="FF0000"/>
-                </a:solidFill>
-                <a:latin typeface="Calibri" panose="020F0502020204030204" pitchFamily="34" charset="0"/>
-              </a:endParaRPr>
             </a:p>
           </p:txBody>
         </p:sp>
@@ -8147,12 +8032,6 @@
                 </a:rPr>
                 <a:t>0</a:t>
               </a:r>
-              <a:endParaRPr lang="fr-FR" dirty="0">
-                <a:solidFill>
-                  <a:srgbClr val="FF0000"/>
-                </a:solidFill>
-                <a:latin typeface="Calibri" panose="020F0502020204030204" pitchFamily="34" charset="0"/>
-              </a:endParaRPr>
             </a:p>
           </p:txBody>
         </p:sp>
@@ -9418,9 +9297,6 @@
               </a:rPr>
               <a:t>objets</a:t>
             </a:r>
-            <a:endParaRPr lang="fr-FR" sz="5400" dirty="0">
-              <a:latin typeface="Calibri" panose="020F0502020204030204" pitchFamily="34" charset="0"/>
-            </a:endParaRPr>
           </a:p>
         </p:txBody>
       </p:sp>
@@ -9496,9 +9372,6 @@
               </a:rPr>
               <a:t>variables</a:t>
             </a:r>
-            <a:endParaRPr lang="fr-FR" sz="5400" dirty="0">
-              <a:latin typeface="Calibri" panose="020F0502020204030204" pitchFamily="34" charset="0"/>
-            </a:endParaRPr>
           </a:p>
         </p:txBody>
       </p:sp>
@@ -9511,7 +9384,7 @@
         <p:spPr>
           <a:xfrm>
             <a:off x="7529946" y="604852"/>
-            <a:ext cx="6669809" cy="1754326"/>
+            <a:ext cx="6669809" cy="3970318"/>
           </a:xfrm>
           <a:prstGeom prst="rect">
             <a:avLst/>
@@ -9538,28 +9411,41 @@
                 <a:latin typeface="Courier New" panose="02070309020205020404" pitchFamily="49" charset="0"/>
                 <a:cs typeface="Courier New" panose="02070309020205020404" pitchFamily="49" charset="0"/>
               </a:rPr>
-              <a:t>&gt;&gt;&gt; </a:t>
+              <a:t>&gt;&gt;&gt; b = a</a:t>
             </a:r>
+          </a:p>
+          <a:p>
             <a:r>
               <a:rPr lang="fr-FR" sz="3600" dirty="0">
                 <a:latin typeface="Courier New" panose="02070309020205020404" pitchFamily="49" charset="0"/>
                 <a:cs typeface="Courier New" panose="02070309020205020404" pitchFamily="49" charset="0"/>
               </a:rPr>
-              <a:t>b </a:t>
+              <a:t>&gt;&gt;&gt; a[0] = </a:t>
             </a:r>
+            <a:r>
+              <a:rPr lang="fr-FR" sz="3600" dirty="0" smtClean="0">
+                <a:latin typeface="Courier New" panose="02070309020205020404" pitchFamily="49" charset="0"/>
+                <a:cs typeface="Courier New" panose="02070309020205020404" pitchFamily="49" charset="0"/>
+              </a:rPr>
+              <a:t>'spam'</a:t>
+            </a:r>
+          </a:p>
+          <a:p>
             <a:r>
               <a:rPr lang="fr-FR" sz="3600" dirty="0">
                 <a:latin typeface="Courier New" panose="02070309020205020404" pitchFamily="49" charset="0"/>
                 <a:cs typeface="Courier New" panose="02070309020205020404" pitchFamily="49" charset="0"/>
               </a:rPr>
-              <a:t>= </a:t>
+              <a:t>&gt;&gt;&gt; a</a:t>
             </a:r>
+          </a:p>
+          <a:p>
             <a:r>
               <a:rPr lang="fr-FR" sz="3600" dirty="0">
                 <a:latin typeface="Courier New" panose="02070309020205020404" pitchFamily="49" charset="0"/>
                 <a:cs typeface="Courier New" panose="02070309020205020404" pitchFamily="49" charset="0"/>
               </a:rPr>
-              <a:t>a</a:t>
+              <a:t>['spam', 2]</a:t>
             </a:r>
           </a:p>
           <a:p>
@@ -9568,15 +9454,21 @@
                 <a:latin typeface="Courier New" panose="02070309020205020404" pitchFamily="49" charset="0"/>
                 <a:cs typeface="Courier New" panose="02070309020205020404" pitchFamily="49" charset="0"/>
               </a:rPr>
-              <a:t>&gt;&gt;&gt; a[0] </a:t>
+              <a:t>&gt;&gt;&gt; b</a:t>
             </a:r>
+          </a:p>
+          <a:p>
             <a:r>
               <a:rPr lang="fr-FR" sz="3600" dirty="0">
                 <a:latin typeface="Courier New" panose="02070309020205020404" pitchFamily="49" charset="0"/>
                 <a:cs typeface="Courier New" panose="02070309020205020404" pitchFamily="49" charset="0"/>
               </a:rPr>
-              <a:t>= 'spam'</a:t>
+              <a:t>['spam', 2]</a:t>
             </a:r>
+            <a:endParaRPr lang="fr-FR" sz="3600" dirty="0">
+              <a:latin typeface="Courier New" panose="02070309020205020404" pitchFamily="49" charset="0"/>
+              <a:cs typeface="Courier New" panose="02070309020205020404" pitchFamily="49" charset="0"/>
+            </a:endParaRPr>
           </a:p>
         </p:txBody>
       </p:sp>
@@ -9614,9 +9506,6 @@
               </a:rPr>
               <a:t>[ , ]</a:t>
             </a:r>
-            <a:endParaRPr lang="fr-FR" sz="5400" dirty="0">
-              <a:latin typeface="Calibri" panose="020F0502020204030204" pitchFamily="34" charset="0"/>
-            </a:endParaRPr>
           </a:p>
         </p:txBody>
       </p:sp>
@@ -9648,9 +9537,6 @@
               </a:rPr>
               <a:t>a</a:t>
             </a:r>
-            <a:endParaRPr lang="fr-FR" sz="5400" dirty="0">
-              <a:latin typeface="Calibri" panose="020F0502020204030204" pitchFamily="34" charset="0"/>
-            </a:endParaRPr>
           </a:p>
         </p:txBody>
       </p:sp>
@@ -9782,12 +9668,6 @@
               </a:rPr>
               <a:t>X</a:t>
             </a:r>
-            <a:endParaRPr lang="fr-FR" sz="5400" dirty="0">
-              <a:solidFill>
-                <a:srgbClr val="FF0000"/>
-              </a:solidFill>
-              <a:latin typeface="Calibri" panose="020F0502020204030204" pitchFamily="34" charset="0"/>
-            </a:endParaRPr>
           </a:p>
         </p:txBody>
       </p:sp>
@@ -9860,9 +9740,6 @@
               </a:rPr>
               <a:t>b</a:t>
             </a:r>
-            <a:endParaRPr lang="fr-FR" sz="5400" dirty="0">
-              <a:latin typeface="Calibri" panose="020F0502020204030204" pitchFamily="34" charset="0"/>
-            </a:endParaRPr>
           </a:p>
         </p:txBody>
       </p:sp>
@@ -10016,9 +9893,6 @@
               </a:rPr>
               <a:t>2</a:t>
             </a:r>
-            <a:endParaRPr lang="fr-FR" sz="5400" dirty="0">
-              <a:latin typeface="Calibri" panose="020F0502020204030204" pitchFamily="34" charset="0"/>
-            </a:endParaRPr>
           </a:p>
         </p:txBody>
       </p:sp>
@@ -11307,6 +11181,214 @@
                                         <p:cTn id="99" dur="500"/>
                                         <p:tgtEl>
                                           <p:spTgt spid="21"/>
+                                        </p:tgtEl>
+                                      </p:cBhvr>
+                                    </p:animEffect>
+                                  </p:childTnLst>
+                                </p:cTn>
+                              </p:par>
+                            </p:childTnLst>
+                          </p:cTn>
+                        </p:par>
+                      </p:childTnLst>
+                    </p:cTn>
+                  </p:par>
+                  <p:par>
+                    <p:cTn id="100" fill="hold">
+                      <p:stCondLst>
+                        <p:cond delay="indefinite"/>
+                      </p:stCondLst>
+                      <p:childTnLst>
+                        <p:par>
+                          <p:cTn id="101" fill="hold">
+                            <p:stCondLst>
+                              <p:cond delay="0"/>
+                            </p:stCondLst>
+                            <p:childTnLst>
+                              <p:par>
+                                <p:cTn id="102" presetID="10" presetClass="entr" presetSubtype="0" fill="hold" nodeType="clickEffect">
+                                  <p:stCondLst>
+                                    <p:cond delay="0"/>
+                                  </p:stCondLst>
+                                  <p:childTnLst>
+                                    <p:set>
+                                      <p:cBhvr>
+                                        <p:cTn id="103" dur="1" fill="hold">
+                                          <p:stCondLst>
+                                            <p:cond delay="0"/>
+                                          </p:stCondLst>
+                                        </p:cTn>
+                                        <p:tgtEl>
+                                          <p:spTgt spid="2">
+                                            <p:txEl>
+                                              <p:pRg st="3" end="3"/>
+                                            </p:txEl>
+                                          </p:spTgt>
+                                        </p:tgtEl>
+                                        <p:attrNameLst>
+                                          <p:attrName>style.visibility</p:attrName>
+                                        </p:attrNameLst>
+                                      </p:cBhvr>
+                                      <p:to>
+                                        <p:strVal val="visible"/>
+                                      </p:to>
+                                    </p:set>
+                                    <p:animEffect transition="in" filter="fade">
+                                      <p:cBhvr>
+                                        <p:cTn id="104" dur="500"/>
+                                        <p:tgtEl>
+                                          <p:spTgt spid="2">
+                                            <p:txEl>
+                                              <p:pRg st="3" end="3"/>
+                                            </p:txEl>
+                                          </p:spTgt>
+                                        </p:tgtEl>
+                                      </p:cBhvr>
+                                    </p:animEffect>
+                                  </p:childTnLst>
+                                </p:cTn>
+                              </p:par>
+                              <p:par>
+                                <p:cTn id="105" presetID="10" presetClass="entr" presetSubtype="0" fill="hold" nodeType="withEffect">
+                                  <p:stCondLst>
+                                    <p:cond delay="0"/>
+                                  </p:stCondLst>
+                                  <p:childTnLst>
+                                    <p:set>
+                                      <p:cBhvr>
+                                        <p:cTn id="106" dur="1" fill="hold">
+                                          <p:stCondLst>
+                                            <p:cond delay="0"/>
+                                          </p:stCondLst>
+                                        </p:cTn>
+                                        <p:tgtEl>
+                                          <p:spTgt spid="2">
+                                            <p:txEl>
+                                              <p:pRg st="4" end="4"/>
+                                            </p:txEl>
+                                          </p:spTgt>
+                                        </p:tgtEl>
+                                        <p:attrNameLst>
+                                          <p:attrName>style.visibility</p:attrName>
+                                        </p:attrNameLst>
+                                      </p:cBhvr>
+                                      <p:to>
+                                        <p:strVal val="visible"/>
+                                      </p:to>
+                                    </p:set>
+                                    <p:animEffect transition="in" filter="fade">
+                                      <p:cBhvr>
+                                        <p:cTn id="107" dur="500"/>
+                                        <p:tgtEl>
+                                          <p:spTgt spid="2">
+                                            <p:txEl>
+                                              <p:pRg st="4" end="4"/>
+                                            </p:txEl>
+                                          </p:spTgt>
+                                        </p:tgtEl>
+                                      </p:cBhvr>
+                                    </p:animEffect>
+                                  </p:childTnLst>
+                                </p:cTn>
+                              </p:par>
+                            </p:childTnLst>
+                          </p:cTn>
+                        </p:par>
+                      </p:childTnLst>
+                    </p:cTn>
+                  </p:par>
+                  <p:par>
+                    <p:cTn id="108" fill="hold">
+                      <p:stCondLst>
+                        <p:cond delay="indefinite"/>
+                      </p:stCondLst>
+                      <p:childTnLst>
+                        <p:par>
+                          <p:cTn id="109" fill="hold">
+                            <p:stCondLst>
+                              <p:cond delay="0"/>
+                            </p:stCondLst>
+                            <p:childTnLst>
+                              <p:par>
+                                <p:cTn id="110" presetID="10" presetClass="entr" presetSubtype="0" fill="hold" nodeType="clickEffect">
+                                  <p:stCondLst>
+                                    <p:cond delay="0"/>
+                                  </p:stCondLst>
+                                  <p:childTnLst>
+                                    <p:set>
+                                      <p:cBhvr>
+                                        <p:cTn id="111" dur="1" fill="hold">
+                                          <p:stCondLst>
+                                            <p:cond delay="0"/>
+                                          </p:stCondLst>
+                                        </p:cTn>
+                                        <p:tgtEl>
+                                          <p:spTgt spid="2">
+                                            <p:txEl>
+                                              <p:pRg st="5" end="5"/>
+                                            </p:txEl>
+                                          </p:spTgt>
+                                        </p:tgtEl>
+                                        <p:attrNameLst>
+                                          <p:attrName>style.visibility</p:attrName>
+                                        </p:attrNameLst>
+                                      </p:cBhvr>
+                                      <p:to>
+                                        <p:strVal val="visible"/>
+                                      </p:to>
+                                    </p:set>
+                                    <p:animEffect transition="in" filter="fade">
+                                      <p:cBhvr>
+                                        <p:cTn id="112" dur="500"/>
+                                        <p:tgtEl>
+                                          <p:spTgt spid="2">
+                                            <p:txEl>
+                                              <p:pRg st="5" end="5"/>
+                                            </p:txEl>
+                                          </p:spTgt>
+                                        </p:tgtEl>
+                                      </p:cBhvr>
+                                    </p:animEffect>
+                                  </p:childTnLst>
+                                </p:cTn>
+                              </p:par>
+                              <p:par>
+                                <p:cTn id="113" presetID="10" presetClass="entr" presetSubtype="0" fill="hold" nodeType="withEffect">
+                                  <p:stCondLst>
+                                    <p:cond delay="0"/>
+                                  </p:stCondLst>
+                                  <p:childTnLst>
+                                    <p:set>
+                                      <p:cBhvr>
+                                        <p:cTn id="114" dur="1" fill="hold">
+                                          <p:stCondLst>
+                                            <p:cond delay="0"/>
+                                          </p:stCondLst>
+                                        </p:cTn>
+                                        <p:tgtEl>
+                                          <p:spTgt spid="2">
+                                            <p:txEl>
+                                              <p:pRg st="6" end="6"/>
+                                            </p:txEl>
+                                          </p:spTgt>
+                                        </p:tgtEl>
+                                        <p:attrNameLst>
+                                          <p:attrName>style.visibility</p:attrName>
+                                        </p:attrNameLst>
+                                      </p:cBhvr>
+                                      <p:to>
+                                        <p:strVal val="visible"/>
+                                      </p:to>
+                                    </p:set>
+                                    <p:animEffect transition="in" filter="fade">
+                                      <p:cBhvr>
+                                        <p:cTn id="115" dur="500"/>
+                                        <p:tgtEl>
+                                          <p:spTgt spid="2">
+                                            <p:txEl>
+                                              <p:pRg st="6" end="6"/>
+                                            </p:txEl>
+                                          </p:spTgt>
                                         </p:tgtEl>
                                       </p:cBhvr>
                                     </p:animEffect>
@@ -11454,9 +11536,6 @@
               </a:rPr>
               <a:t>objets</a:t>
             </a:r>
-            <a:endParaRPr lang="fr-FR" sz="5400" dirty="0">
-              <a:latin typeface="Calibri" panose="020F0502020204030204" pitchFamily="34" charset="0"/>
-            </a:endParaRPr>
           </a:p>
         </p:txBody>
       </p:sp>
@@ -11532,9 +11611,6 @@
               </a:rPr>
               <a:t>variables</a:t>
             </a:r>
-            <a:endParaRPr lang="fr-FR" sz="5400" dirty="0">
-              <a:latin typeface="Calibri" panose="020F0502020204030204" pitchFamily="34" charset="0"/>
-            </a:endParaRPr>
           </a:p>
         </p:txBody>
       </p:sp>
@@ -11547,7 +11623,7 @@
         <p:spPr>
           <a:xfrm>
             <a:off x="7466535" y="318526"/>
-            <a:ext cx="8544296" cy="1754326"/>
+            <a:ext cx="8544296" cy="4524315"/>
           </a:xfrm>
           <a:prstGeom prst="rect">
             <a:avLst/>
@@ -11574,40 +11650,64 @@
                 <a:latin typeface="Courier New" panose="02070309020205020404" pitchFamily="49" charset="0"/>
                 <a:cs typeface="Courier New" panose="02070309020205020404" pitchFamily="49" charset="0"/>
               </a:rPr>
-              <a:t>&gt;&gt;&gt; </a:t>
+              <a:t>&gt;&gt;&gt; b = a[:] </a:t>
             </a:r>
+            <a:endParaRPr lang="fr-FR" sz="3600" dirty="0" smtClean="0">
+              <a:latin typeface="Courier New" panose="02070309020205020404" pitchFamily="49" charset="0"/>
+              <a:cs typeface="Courier New" panose="02070309020205020404" pitchFamily="49" charset="0"/>
+            </a:endParaRPr>
+          </a:p>
+          <a:p>
+            <a:r>
+              <a:rPr lang="fr-FR" sz="3600" dirty="0" smtClean="0">
+                <a:latin typeface="Courier New" panose="02070309020205020404" pitchFamily="49" charset="0"/>
+                <a:cs typeface="Courier New" panose="02070309020205020404" pitchFamily="49" charset="0"/>
+              </a:rPr>
+              <a:t>&gt;&gt;&gt; a[0] = </a:t>
+            </a:r>
+            <a:r>
+              <a:rPr lang="fr-FR" sz="3600" dirty="0" smtClean="0">
+                <a:latin typeface="Courier New" panose="02070309020205020404" pitchFamily="49" charset="0"/>
+                <a:cs typeface="Courier New" panose="02070309020205020404" pitchFamily="49" charset="0"/>
+              </a:rPr>
+              <a:t>'spam'</a:t>
+            </a:r>
+          </a:p>
+          <a:p>
             <a:r>
               <a:rPr lang="fr-FR" sz="3600" dirty="0">
                 <a:latin typeface="Courier New" panose="02070309020205020404" pitchFamily="49" charset="0"/>
                 <a:cs typeface="Courier New" panose="02070309020205020404" pitchFamily="49" charset="0"/>
               </a:rPr>
-              <a:t>b </a:t>
+              <a:t>&gt;&gt;&gt; a</a:t>
             </a:r>
+          </a:p>
+          <a:p>
             <a:r>
               <a:rPr lang="fr-FR" sz="3600" dirty="0">
                 <a:latin typeface="Courier New" panose="02070309020205020404" pitchFamily="49" charset="0"/>
                 <a:cs typeface="Courier New" panose="02070309020205020404" pitchFamily="49" charset="0"/>
               </a:rPr>
-              <a:t>= </a:t>
+              <a:t>['spam', 2]</a:t>
             </a:r>
+          </a:p>
+          <a:p>
             <a:r>
               <a:rPr lang="fr-FR" sz="3600" dirty="0">
                 <a:latin typeface="Courier New" panose="02070309020205020404" pitchFamily="49" charset="0"/>
                 <a:cs typeface="Courier New" panose="02070309020205020404" pitchFamily="49" charset="0"/>
               </a:rPr>
-              <a:t>a</a:t>
+              <a:t>&gt;&gt;&gt; b</a:t>
             </a:r>
+          </a:p>
+          <a:p>
             <a:r>
               <a:rPr lang="fr-FR" sz="3600" dirty="0">
                 <a:latin typeface="Courier New" panose="02070309020205020404" pitchFamily="49" charset="0"/>
                 <a:cs typeface="Courier New" panose="02070309020205020404" pitchFamily="49" charset="0"/>
               </a:rPr>
-              <a:t>[:] </a:t>
+              <a:t>[1, 2]</a:t>
             </a:r>
-            <a:endParaRPr lang="fr-FR" sz="3600" dirty="0" smtClean="0">
-              <a:latin typeface="Courier New" panose="02070309020205020404" pitchFamily="49" charset="0"/>
-              <a:cs typeface="Courier New" panose="02070309020205020404" pitchFamily="49" charset="0"/>
-            </a:endParaRPr>
           </a:p>
           <a:p>
             <a:r>
@@ -11615,7 +11715,7 @@
                 <a:latin typeface="Courier New" panose="02070309020205020404" pitchFamily="49" charset="0"/>
                 <a:cs typeface="Courier New" panose="02070309020205020404" pitchFamily="49" charset="0"/>
               </a:rPr>
-              <a:t>&gt;&gt;&gt; a[0] = 'spam'</a:t>
+              <a:t> </a:t>
             </a:r>
             <a:endParaRPr lang="fr-FR" sz="3600" dirty="0">
               <a:latin typeface="Courier New" panose="02070309020205020404" pitchFamily="49" charset="0"/>
@@ -11658,9 +11758,6 @@
               </a:rPr>
               <a:t>[ , ]</a:t>
             </a:r>
-            <a:endParaRPr lang="fr-FR" sz="3200" dirty="0">
-              <a:latin typeface="Calibri" panose="020F0502020204030204" pitchFamily="34" charset="0"/>
-            </a:endParaRPr>
           </a:p>
         </p:txBody>
       </p:sp>
@@ -11692,9 +11789,6 @@
               </a:rPr>
               <a:t>a</a:t>
             </a:r>
-            <a:endParaRPr lang="fr-FR" sz="5400" dirty="0">
-              <a:latin typeface="Calibri" panose="020F0502020204030204" pitchFamily="34" charset="0"/>
-            </a:endParaRPr>
           </a:p>
         </p:txBody>
       </p:sp>
@@ -11844,12 +11938,6 @@
               </a:rPr>
               <a:t>X</a:t>
             </a:r>
-            <a:endParaRPr lang="fr-FR" sz="5400" dirty="0">
-              <a:solidFill>
-                <a:srgbClr val="FF0000"/>
-              </a:solidFill>
-              <a:latin typeface="Calibri" panose="020F0502020204030204" pitchFamily="34" charset="0"/>
-            </a:endParaRPr>
           </a:p>
         </p:txBody>
       </p:sp>
@@ -11922,9 +12010,6 @@
               </a:rPr>
               <a:t>b</a:t>
             </a:r>
-            <a:endParaRPr lang="fr-FR" sz="5400" dirty="0">
-              <a:latin typeface="Calibri" panose="020F0502020204030204" pitchFamily="34" charset="0"/>
-            </a:endParaRPr>
           </a:p>
         </p:txBody>
       </p:sp>
@@ -12102,9 +12187,6 @@
               </a:rPr>
               <a:t>2</a:t>
             </a:r>
-            <a:endParaRPr lang="fr-FR" sz="3200" dirty="0">
-              <a:latin typeface="Calibri" panose="020F0502020204030204" pitchFamily="34" charset="0"/>
-            </a:endParaRPr>
           </a:p>
         </p:txBody>
       </p:sp>
@@ -12397,9 +12479,6 @@
               </a:rPr>
               <a:t>[ , ]</a:t>
             </a:r>
-            <a:endParaRPr lang="fr-FR" sz="3200" dirty="0">
-              <a:latin typeface="Calibri" panose="020F0502020204030204" pitchFamily="34" charset="0"/>
-            </a:endParaRPr>
           </a:p>
         </p:txBody>
       </p:sp>
@@ -13802,6 +13881,214 @@
                                         <p:cTn id="113" dur="500"/>
                                         <p:tgtEl>
                                           <p:spTgt spid="21"/>
+                                        </p:tgtEl>
+                                      </p:cBhvr>
+                                    </p:animEffect>
+                                  </p:childTnLst>
+                                </p:cTn>
+                              </p:par>
+                            </p:childTnLst>
+                          </p:cTn>
+                        </p:par>
+                      </p:childTnLst>
+                    </p:cTn>
+                  </p:par>
+                  <p:par>
+                    <p:cTn id="114" fill="hold">
+                      <p:stCondLst>
+                        <p:cond delay="indefinite"/>
+                      </p:stCondLst>
+                      <p:childTnLst>
+                        <p:par>
+                          <p:cTn id="115" fill="hold">
+                            <p:stCondLst>
+                              <p:cond delay="0"/>
+                            </p:stCondLst>
+                            <p:childTnLst>
+                              <p:par>
+                                <p:cTn id="116" presetID="10" presetClass="entr" presetSubtype="0" fill="hold" nodeType="clickEffect">
+                                  <p:stCondLst>
+                                    <p:cond delay="0"/>
+                                  </p:stCondLst>
+                                  <p:childTnLst>
+                                    <p:set>
+                                      <p:cBhvr>
+                                        <p:cTn id="117" dur="1" fill="hold">
+                                          <p:stCondLst>
+                                            <p:cond delay="0"/>
+                                          </p:stCondLst>
+                                        </p:cTn>
+                                        <p:tgtEl>
+                                          <p:spTgt spid="2">
+                                            <p:txEl>
+                                              <p:pRg st="3" end="3"/>
+                                            </p:txEl>
+                                          </p:spTgt>
+                                        </p:tgtEl>
+                                        <p:attrNameLst>
+                                          <p:attrName>style.visibility</p:attrName>
+                                        </p:attrNameLst>
+                                      </p:cBhvr>
+                                      <p:to>
+                                        <p:strVal val="visible"/>
+                                      </p:to>
+                                    </p:set>
+                                    <p:animEffect transition="in" filter="fade">
+                                      <p:cBhvr>
+                                        <p:cTn id="118" dur="500"/>
+                                        <p:tgtEl>
+                                          <p:spTgt spid="2">
+                                            <p:txEl>
+                                              <p:pRg st="3" end="3"/>
+                                            </p:txEl>
+                                          </p:spTgt>
+                                        </p:tgtEl>
+                                      </p:cBhvr>
+                                    </p:animEffect>
+                                  </p:childTnLst>
+                                </p:cTn>
+                              </p:par>
+                              <p:par>
+                                <p:cTn id="119" presetID="10" presetClass="entr" presetSubtype="0" fill="hold" nodeType="withEffect">
+                                  <p:stCondLst>
+                                    <p:cond delay="0"/>
+                                  </p:stCondLst>
+                                  <p:childTnLst>
+                                    <p:set>
+                                      <p:cBhvr>
+                                        <p:cTn id="120" dur="1" fill="hold">
+                                          <p:stCondLst>
+                                            <p:cond delay="0"/>
+                                          </p:stCondLst>
+                                        </p:cTn>
+                                        <p:tgtEl>
+                                          <p:spTgt spid="2">
+                                            <p:txEl>
+                                              <p:pRg st="4" end="4"/>
+                                            </p:txEl>
+                                          </p:spTgt>
+                                        </p:tgtEl>
+                                        <p:attrNameLst>
+                                          <p:attrName>style.visibility</p:attrName>
+                                        </p:attrNameLst>
+                                      </p:cBhvr>
+                                      <p:to>
+                                        <p:strVal val="visible"/>
+                                      </p:to>
+                                    </p:set>
+                                    <p:animEffect transition="in" filter="fade">
+                                      <p:cBhvr>
+                                        <p:cTn id="121" dur="500"/>
+                                        <p:tgtEl>
+                                          <p:spTgt spid="2">
+                                            <p:txEl>
+                                              <p:pRg st="4" end="4"/>
+                                            </p:txEl>
+                                          </p:spTgt>
+                                        </p:tgtEl>
+                                      </p:cBhvr>
+                                    </p:animEffect>
+                                  </p:childTnLst>
+                                </p:cTn>
+                              </p:par>
+                            </p:childTnLst>
+                          </p:cTn>
+                        </p:par>
+                      </p:childTnLst>
+                    </p:cTn>
+                  </p:par>
+                  <p:par>
+                    <p:cTn id="122" fill="hold">
+                      <p:stCondLst>
+                        <p:cond delay="indefinite"/>
+                      </p:stCondLst>
+                      <p:childTnLst>
+                        <p:par>
+                          <p:cTn id="123" fill="hold">
+                            <p:stCondLst>
+                              <p:cond delay="0"/>
+                            </p:stCondLst>
+                            <p:childTnLst>
+                              <p:par>
+                                <p:cTn id="124" presetID="10" presetClass="entr" presetSubtype="0" fill="hold" nodeType="clickEffect">
+                                  <p:stCondLst>
+                                    <p:cond delay="0"/>
+                                  </p:stCondLst>
+                                  <p:childTnLst>
+                                    <p:set>
+                                      <p:cBhvr>
+                                        <p:cTn id="125" dur="1" fill="hold">
+                                          <p:stCondLst>
+                                            <p:cond delay="0"/>
+                                          </p:stCondLst>
+                                        </p:cTn>
+                                        <p:tgtEl>
+                                          <p:spTgt spid="2">
+                                            <p:txEl>
+                                              <p:pRg st="5" end="5"/>
+                                            </p:txEl>
+                                          </p:spTgt>
+                                        </p:tgtEl>
+                                        <p:attrNameLst>
+                                          <p:attrName>style.visibility</p:attrName>
+                                        </p:attrNameLst>
+                                      </p:cBhvr>
+                                      <p:to>
+                                        <p:strVal val="visible"/>
+                                      </p:to>
+                                    </p:set>
+                                    <p:animEffect transition="in" filter="fade">
+                                      <p:cBhvr>
+                                        <p:cTn id="126" dur="500"/>
+                                        <p:tgtEl>
+                                          <p:spTgt spid="2">
+                                            <p:txEl>
+                                              <p:pRg st="5" end="5"/>
+                                            </p:txEl>
+                                          </p:spTgt>
+                                        </p:tgtEl>
+                                      </p:cBhvr>
+                                    </p:animEffect>
+                                  </p:childTnLst>
+                                </p:cTn>
+                              </p:par>
+                              <p:par>
+                                <p:cTn id="127" presetID="10" presetClass="entr" presetSubtype="0" fill="hold" nodeType="withEffect">
+                                  <p:stCondLst>
+                                    <p:cond delay="0"/>
+                                  </p:stCondLst>
+                                  <p:childTnLst>
+                                    <p:set>
+                                      <p:cBhvr>
+                                        <p:cTn id="128" dur="1" fill="hold">
+                                          <p:stCondLst>
+                                            <p:cond delay="0"/>
+                                          </p:stCondLst>
+                                        </p:cTn>
+                                        <p:tgtEl>
+                                          <p:spTgt spid="2">
+                                            <p:txEl>
+                                              <p:pRg st="6" end="6"/>
+                                            </p:txEl>
+                                          </p:spTgt>
+                                        </p:tgtEl>
+                                        <p:attrNameLst>
+                                          <p:attrName>style.visibility</p:attrName>
+                                        </p:attrNameLst>
+                                      </p:cBhvr>
+                                      <p:to>
+                                        <p:strVal val="visible"/>
+                                      </p:to>
+                                    </p:set>
+                                    <p:animEffect transition="in" filter="fade">
+                                      <p:cBhvr>
+                                        <p:cTn id="129" dur="500"/>
+                                        <p:tgtEl>
+                                          <p:spTgt spid="2">
+                                            <p:txEl>
+                                              <p:pRg st="6" end="6"/>
+                                            </p:txEl>
+                                          </p:spTgt>
                                         </p:tgtEl>
                                       </p:cBhvr>
                                     </p:animEffect>
@@ -13952,9 +14239,6 @@
               </a:rPr>
               <a:t>objets</a:t>
             </a:r>
-            <a:endParaRPr lang="fr-FR" sz="5400" dirty="0">
-              <a:latin typeface="Calibri" panose="020F0502020204030204" pitchFamily="34" charset="0"/>
-            </a:endParaRPr>
           </a:p>
         </p:txBody>
       </p:sp>
@@ -14030,9 +14314,6 @@
               </a:rPr>
               <a:t>variables</a:t>
             </a:r>
-            <a:endParaRPr lang="fr-FR" sz="5400" dirty="0">
-              <a:latin typeface="Calibri" panose="020F0502020204030204" pitchFamily="34" charset="0"/>
-            </a:endParaRPr>
           </a:p>
         </p:txBody>
       </p:sp>
@@ -14045,7 +14326,7 @@
         <p:spPr>
           <a:xfrm>
             <a:off x="6696476" y="289926"/>
-            <a:ext cx="8686800" cy="1754326"/>
+            <a:ext cx="8686800" cy="3970318"/>
           </a:xfrm>
           <a:prstGeom prst="rect">
             <a:avLst/>
@@ -14072,28 +14353,41 @@
                 <a:latin typeface="Courier New" panose="02070309020205020404" pitchFamily="49" charset="0"/>
                 <a:cs typeface="Courier New" panose="02070309020205020404" pitchFamily="49" charset="0"/>
               </a:rPr>
-              <a:t>&gt;&gt;&gt; </a:t>
+              <a:t>&gt;&gt;&gt; b = a[:] </a:t>
             </a:r>
+          </a:p>
+          <a:p>
             <a:r>
               <a:rPr lang="fr-FR" sz="3600" dirty="0">
                 <a:latin typeface="Courier New" panose="02070309020205020404" pitchFamily="49" charset="0"/>
                 <a:cs typeface="Courier New" panose="02070309020205020404" pitchFamily="49" charset="0"/>
               </a:rPr>
-              <a:t>b </a:t>
+              <a:t>&gt;&gt;&gt; a[1][0] = </a:t>
             </a:r>
+            <a:r>
+              <a:rPr lang="fr-FR" sz="3600" dirty="0" smtClean="0">
+                <a:latin typeface="Courier New" panose="02070309020205020404" pitchFamily="49" charset="0"/>
+                <a:cs typeface="Courier New" panose="02070309020205020404" pitchFamily="49" charset="0"/>
+              </a:rPr>
+              <a:t>'spam'</a:t>
+            </a:r>
+          </a:p>
+          <a:p>
             <a:r>
               <a:rPr lang="fr-FR" sz="3600" dirty="0">
                 <a:latin typeface="Courier New" panose="02070309020205020404" pitchFamily="49" charset="0"/>
                 <a:cs typeface="Courier New" panose="02070309020205020404" pitchFamily="49" charset="0"/>
               </a:rPr>
-              <a:t>= a</a:t>
+              <a:t>&gt;&gt;&gt; a</a:t>
             </a:r>
+          </a:p>
+          <a:p>
             <a:r>
               <a:rPr lang="fr-FR" sz="3600" dirty="0">
                 <a:latin typeface="Courier New" panose="02070309020205020404" pitchFamily="49" charset="0"/>
                 <a:cs typeface="Courier New" panose="02070309020205020404" pitchFamily="49" charset="0"/>
               </a:rPr>
-              <a:t>[:] </a:t>
+              <a:t>[1, ['spam']]</a:t>
             </a:r>
           </a:p>
           <a:p>
@@ -14102,15 +14396,21 @@
                 <a:latin typeface="Courier New" panose="02070309020205020404" pitchFamily="49" charset="0"/>
                 <a:cs typeface="Courier New" panose="02070309020205020404" pitchFamily="49" charset="0"/>
               </a:rPr>
-              <a:t>&gt;&gt;&gt; a[1][0] </a:t>
+              <a:t>&gt;&gt;&gt; b</a:t>
             </a:r>
+          </a:p>
+          <a:p>
             <a:r>
               <a:rPr lang="fr-FR" sz="3600" dirty="0">
                 <a:latin typeface="Courier New" panose="02070309020205020404" pitchFamily="49" charset="0"/>
                 <a:cs typeface="Courier New" panose="02070309020205020404" pitchFamily="49" charset="0"/>
               </a:rPr>
-              <a:t>= 'spam'</a:t>
+              <a:t>[1, ['spam']]</a:t>
             </a:r>
+            <a:endParaRPr lang="fr-FR" sz="3600" dirty="0">
+              <a:latin typeface="Courier New" panose="02070309020205020404" pitchFamily="49" charset="0"/>
+              <a:cs typeface="Courier New" panose="02070309020205020404" pitchFamily="49" charset="0"/>
+            </a:endParaRPr>
           </a:p>
         </p:txBody>
       </p:sp>
@@ -14148,9 +14448,6 @@
               </a:rPr>
               <a:t>[ , ]</a:t>
             </a:r>
-            <a:endParaRPr lang="fr-FR" sz="3200" dirty="0">
-              <a:latin typeface="Calibri" panose="020F0502020204030204" pitchFamily="34" charset="0"/>
-            </a:endParaRPr>
           </a:p>
         </p:txBody>
       </p:sp>
@@ -14182,9 +14479,6 @@
               </a:rPr>
               <a:t>a</a:t>
             </a:r>
-            <a:endParaRPr lang="fr-FR" sz="5400" dirty="0">
-              <a:latin typeface="Calibri" panose="020F0502020204030204" pitchFamily="34" charset="0"/>
-            </a:endParaRPr>
           </a:p>
         </p:txBody>
       </p:sp>
@@ -14418,12 +14712,6 @@
               </a:rPr>
               <a:t>X</a:t>
             </a:r>
-            <a:endParaRPr lang="fr-FR" sz="5400" dirty="0">
-              <a:solidFill>
-                <a:srgbClr val="FF0000"/>
-              </a:solidFill>
-              <a:latin typeface="Calibri" panose="020F0502020204030204" pitchFamily="34" charset="0"/>
-            </a:endParaRPr>
           </a:p>
         </p:txBody>
       </p:sp>
@@ -14496,9 +14784,6 @@
               </a:rPr>
               <a:t>b</a:t>
             </a:r>
-            <a:endParaRPr lang="fr-FR" sz="5400" dirty="0">
-              <a:latin typeface="Calibri" panose="020F0502020204030204" pitchFamily="34" charset="0"/>
-            </a:endParaRPr>
           </a:p>
         </p:txBody>
       </p:sp>
@@ -14724,9 +15009,6 @@
               </a:rPr>
               <a:t>2</a:t>
             </a:r>
-            <a:endParaRPr lang="fr-FR" sz="3200" dirty="0">
-              <a:latin typeface="Calibri" panose="020F0502020204030204" pitchFamily="34" charset="0"/>
-            </a:endParaRPr>
           </a:p>
         </p:txBody>
       </p:sp>
@@ -15079,9 +15361,6 @@
               </a:rPr>
               <a:t>[ , ]</a:t>
             </a:r>
-            <a:endParaRPr lang="fr-FR" sz="3200" dirty="0">
-              <a:latin typeface="Calibri" panose="020F0502020204030204" pitchFamily="34" charset="0"/>
-            </a:endParaRPr>
           </a:p>
         </p:txBody>
       </p:sp>
@@ -15319,9 +15598,6 @@
               </a:rPr>
               <a:t>[ ]</a:t>
             </a:r>
-            <a:endParaRPr lang="fr-FR" sz="3200" dirty="0">
-              <a:latin typeface="Calibri" panose="020F0502020204030204" pitchFamily="34" charset="0"/>
-            </a:endParaRPr>
           </a:p>
         </p:txBody>
       </p:sp>
@@ -16721,6 +16997,214 @@
                                         <p:cTn id="123" dur="500"/>
                                         <p:tgtEl>
                                           <p:spTgt spid="21"/>
+                                        </p:tgtEl>
+                                      </p:cBhvr>
+                                    </p:animEffect>
+                                  </p:childTnLst>
+                                </p:cTn>
+                              </p:par>
+                            </p:childTnLst>
+                          </p:cTn>
+                        </p:par>
+                      </p:childTnLst>
+                    </p:cTn>
+                  </p:par>
+                  <p:par>
+                    <p:cTn id="124" fill="hold">
+                      <p:stCondLst>
+                        <p:cond delay="indefinite"/>
+                      </p:stCondLst>
+                      <p:childTnLst>
+                        <p:par>
+                          <p:cTn id="125" fill="hold">
+                            <p:stCondLst>
+                              <p:cond delay="0"/>
+                            </p:stCondLst>
+                            <p:childTnLst>
+                              <p:par>
+                                <p:cTn id="126" presetID="10" presetClass="entr" presetSubtype="0" fill="hold" nodeType="clickEffect">
+                                  <p:stCondLst>
+                                    <p:cond delay="0"/>
+                                  </p:stCondLst>
+                                  <p:childTnLst>
+                                    <p:set>
+                                      <p:cBhvr>
+                                        <p:cTn id="127" dur="1" fill="hold">
+                                          <p:stCondLst>
+                                            <p:cond delay="0"/>
+                                          </p:stCondLst>
+                                        </p:cTn>
+                                        <p:tgtEl>
+                                          <p:spTgt spid="2">
+                                            <p:txEl>
+                                              <p:pRg st="3" end="3"/>
+                                            </p:txEl>
+                                          </p:spTgt>
+                                        </p:tgtEl>
+                                        <p:attrNameLst>
+                                          <p:attrName>style.visibility</p:attrName>
+                                        </p:attrNameLst>
+                                      </p:cBhvr>
+                                      <p:to>
+                                        <p:strVal val="visible"/>
+                                      </p:to>
+                                    </p:set>
+                                    <p:animEffect transition="in" filter="fade">
+                                      <p:cBhvr>
+                                        <p:cTn id="128" dur="500"/>
+                                        <p:tgtEl>
+                                          <p:spTgt spid="2">
+                                            <p:txEl>
+                                              <p:pRg st="3" end="3"/>
+                                            </p:txEl>
+                                          </p:spTgt>
+                                        </p:tgtEl>
+                                      </p:cBhvr>
+                                    </p:animEffect>
+                                  </p:childTnLst>
+                                </p:cTn>
+                              </p:par>
+                              <p:par>
+                                <p:cTn id="129" presetID="10" presetClass="entr" presetSubtype="0" fill="hold" nodeType="withEffect">
+                                  <p:stCondLst>
+                                    <p:cond delay="0"/>
+                                  </p:stCondLst>
+                                  <p:childTnLst>
+                                    <p:set>
+                                      <p:cBhvr>
+                                        <p:cTn id="130" dur="1" fill="hold">
+                                          <p:stCondLst>
+                                            <p:cond delay="0"/>
+                                          </p:stCondLst>
+                                        </p:cTn>
+                                        <p:tgtEl>
+                                          <p:spTgt spid="2">
+                                            <p:txEl>
+                                              <p:pRg st="4" end="4"/>
+                                            </p:txEl>
+                                          </p:spTgt>
+                                        </p:tgtEl>
+                                        <p:attrNameLst>
+                                          <p:attrName>style.visibility</p:attrName>
+                                        </p:attrNameLst>
+                                      </p:cBhvr>
+                                      <p:to>
+                                        <p:strVal val="visible"/>
+                                      </p:to>
+                                    </p:set>
+                                    <p:animEffect transition="in" filter="fade">
+                                      <p:cBhvr>
+                                        <p:cTn id="131" dur="500"/>
+                                        <p:tgtEl>
+                                          <p:spTgt spid="2">
+                                            <p:txEl>
+                                              <p:pRg st="4" end="4"/>
+                                            </p:txEl>
+                                          </p:spTgt>
+                                        </p:tgtEl>
+                                      </p:cBhvr>
+                                    </p:animEffect>
+                                  </p:childTnLst>
+                                </p:cTn>
+                              </p:par>
+                            </p:childTnLst>
+                          </p:cTn>
+                        </p:par>
+                      </p:childTnLst>
+                    </p:cTn>
+                  </p:par>
+                  <p:par>
+                    <p:cTn id="132" fill="hold">
+                      <p:stCondLst>
+                        <p:cond delay="indefinite"/>
+                      </p:stCondLst>
+                      <p:childTnLst>
+                        <p:par>
+                          <p:cTn id="133" fill="hold">
+                            <p:stCondLst>
+                              <p:cond delay="0"/>
+                            </p:stCondLst>
+                            <p:childTnLst>
+                              <p:par>
+                                <p:cTn id="134" presetID="10" presetClass="entr" presetSubtype="0" fill="hold" nodeType="clickEffect">
+                                  <p:stCondLst>
+                                    <p:cond delay="0"/>
+                                  </p:stCondLst>
+                                  <p:childTnLst>
+                                    <p:set>
+                                      <p:cBhvr>
+                                        <p:cTn id="135" dur="1" fill="hold">
+                                          <p:stCondLst>
+                                            <p:cond delay="0"/>
+                                          </p:stCondLst>
+                                        </p:cTn>
+                                        <p:tgtEl>
+                                          <p:spTgt spid="2">
+                                            <p:txEl>
+                                              <p:pRg st="5" end="5"/>
+                                            </p:txEl>
+                                          </p:spTgt>
+                                        </p:tgtEl>
+                                        <p:attrNameLst>
+                                          <p:attrName>style.visibility</p:attrName>
+                                        </p:attrNameLst>
+                                      </p:cBhvr>
+                                      <p:to>
+                                        <p:strVal val="visible"/>
+                                      </p:to>
+                                    </p:set>
+                                    <p:animEffect transition="in" filter="fade">
+                                      <p:cBhvr>
+                                        <p:cTn id="136" dur="500"/>
+                                        <p:tgtEl>
+                                          <p:spTgt spid="2">
+                                            <p:txEl>
+                                              <p:pRg st="5" end="5"/>
+                                            </p:txEl>
+                                          </p:spTgt>
+                                        </p:tgtEl>
+                                      </p:cBhvr>
+                                    </p:animEffect>
+                                  </p:childTnLst>
+                                </p:cTn>
+                              </p:par>
+                              <p:par>
+                                <p:cTn id="137" presetID="10" presetClass="entr" presetSubtype="0" fill="hold" nodeType="withEffect">
+                                  <p:stCondLst>
+                                    <p:cond delay="0"/>
+                                  </p:stCondLst>
+                                  <p:childTnLst>
+                                    <p:set>
+                                      <p:cBhvr>
+                                        <p:cTn id="138" dur="1" fill="hold">
+                                          <p:stCondLst>
+                                            <p:cond delay="0"/>
+                                          </p:stCondLst>
+                                        </p:cTn>
+                                        <p:tgtEl>
+                                          <p:spTgt spid="2">
+                                            <p:txEl>
+                                              <p:pRg st="6" end="6"/>
+                                            </p:txEl>
+                                          </p:spTgt>
+                                        </p:tgtEl>
+                                        <p:attrNameLst>
+                                          <p:attrName>style.visibility</p:attrName>
+                                        </p:attrNameLst>
+                                      </p:cBhvr>
+                                      <p:to>
+                                        <p:strVal val="visible"/>
+                                      </p:to>
+                                    </p:set>
+                                    <p:animEffect transition="in" filter="fade">
+                                      <p:cBhvr>
+                                        <p:cTn id="139" dur="500"/>
+                                        <p:tgtEl>
+                                          <p:spTgt spid="2">
+                                            <p:txEl>
+                                              <p:pRg st="6" end="6"/>
+                                            </p:txEl>
+                                          </p:spTgt>
                                         </p:tgtEl>
                                       </p:cBhvr>
                                     </p:animEffect>
@@ -16873,9 +17357,6 @@
               </a:rPr>
               <a:t>objets</a:t>
             </a:r>
-            <a:endParaRPr lang="fr-FR" sz="5400" dirty="0">
-              <a:latin typeface="Calibri" panose="020F0502020204030204" pitchFamily="34" charset="0"/>
-            </a:endParaRPr>
           </a:p>
         </p:txBody>
       </p:sp>
@@ -16951,9 +17432,6 @@
               </a:rPr>
               <a:t>variables</a:t>
             </a:r>
-            <a:endParaRPr lang="fr-FR" sz="5400" dirty="0">
-              <a:latin typeface="Calibri" panose="020F0502020204030204" pitchFamily="34" charset="0"/>
-            </a:endParaRPr>
           </a:p>
         </p:txBody>
       </p:sp>
@@ -16966,7 +17444,7 @@
         <p:spPr>
           <a:xfrm>
             <a:off x="315802" y="-151"/>
-            <a:ext cx="8686800" cy="2308324"/>
+            <a:ext cx="6781385" cy="2308324"/>
           </a:xfrm>
           <a:prstGeom prst="rect">
             <a:avLst/>
@@ -17002,14 +17480,7 @@
                 <a:latin typeface="Courier New" panose="02070309020205020404" pitchFamily="49" charset="0"/>
                 <a:cs typeface="Courier New" panose="02070309020205020404" pitchFamily="49" charset="0"/>
               </a:rPr>
-              <a:t>&gt;&gt;&gt; </a:t>
-            </a:r>
-            <a:r>
-              <a:rPr lang="fr-FR" sz="3600" dirty="0">
-                <a:latin typeface="Courier New" panose="02070309020205020404" pitchFamily="49" charset="0"/>
-                <a:cs typeface="Courier New" panose="02070309020205020404" pitchFamily="49" charset="0"/>
-              </a:rPr>
-              <a:t>b = </a:t>
+              <a:t>&gt;&gt;&gt; b = </a:t>
             </a:r>
             <a:r>
               <a:rPr lang="fr-FR" sz="3600" dirty="0" err="1">
@@ -17032,14 +17503,7 @@
                 <a:latin typeface="Courier New" panose="02070309020205020404" pitchFamily="49" charset="0"/>
                 <a:cs typeface="Courier New" panose="02070309020205020404" pitchFamily="49" charset="0"/>
               </a:rPr>
-              <a:t>&gt;&gt;&gt; a[1][0] </a:t>
-            </a:r>
-            <a:r>
-              <a:rPr lang="fr-FR" sz="3600" dirty="0">
-                <a:latin typeface="Courier New" panose="02070309020205020404" pitchFamily="49" charset="0"/>
-                <a:cs typeface="Courier New" panose="02070309020205020404" pitchFamily="49" charset="0"/>
-              </a:rPr>
-              <a:t>= 'spam'</a:t>
+              <a:t>&gt;&gt;&gt; a[1][0] = 'spam'</a:t>
             </a:r>
           </a:p>
         </p:txBody>
@@ -17078,9 +17542,6 @@
               </a:rPr>
               <a:t>[ , ]</a:t>
             </a:r>
-            <a:endParaRPr lang="fr-FR" sz="3200" dirty="0">
-              <a:latin typeface="Calibri" panose="020F0502020204030204" pitchFamily="34" charset="0"/>
-            </a:endParaRPr>
           </a:p>
         </p:txBody>
       </p:sp>
@@ -17112,9 +17573,6 @@
               </a:rPr>
               <a:t>a</a:t>
             </a:r>
-            <a:endParaRPr lang="fr-FR" sz="5400" dirty="0">
-              <a:latin typeface="Calibri" panose="020F0502020204030204" pitchFamily="34" charset="0"/>
-            </a:endParaRPr>
           </a:p>
         </p:txBody>
       </p:sp>
@@ -17264,12 +17722,6 @@
               </a:rPr>
               <a:t>X</a:t>
             </a:r>
-            <a:endParaRPr lang="fr-FR" sz="5400" dirty="0">
-              <a:solidFill>
-                <a:srgbClr val="FF0000"/>
-              </a:solidFill>
-              <a:latin typeface="Calibri" panose="020F0502020204030204" pitchFamily="34" charset="0"/>
-            </a:endParaRPr>
           </a:p>
         </p:txBody>
       </p:sp>
@@ -17342,9 +17794,6 @@
               </a:rPr>
               <a:t>b</a:t>
             </a:r>
-            <a:endParaRPr lang="fr-FR" sz="5400" dirty="0">
-              <a:latin typeface="Calibri" panose="020F0502020204030204" pitchFamily="34" charset="0"/>
-            </a:endParaRPr>
           </a:p>
         </p:txBody>
       </p:sp>
@@ -17540,9 +17989,6 @@
               </a:rPr>
               <a:t>2</a:t>
             </a:r>
-            <a:endParaRPr lang="fr-FR" sz="3200" dirty="0">
-              <a:latin typeface="Calibri" panose="020F0502020204030204" pitchFamily="34" charset="0"/>
-            </a:endParaRPr>
           </a:p>
         </p:txBody>
       </p:sp>
@@ -17901,9 +18347,6 @@
               </a:rPr>
               <a:t>[ , ]</a:t>
             </a:r>
-            <a:endParaRPr lang="fr-FR" sz="3200" dirty="0">
-              <a:latin typeface="Calibri" panose="020F0502020204030204" pitchFamily="34" charset="0"/>
-            </a:endParaRPr>
           </a:p>
         </p:txBody>
       </p:sp>
@@ -17941,9 +18384,6 @@
               </a:rPr>
               <a:t>[ ]</a:t>
             </a:r>
-            <a:endParaRPr lang="fr-FR" sz="3200" dirty="0">
-              <a:latin typeface="Calibri" panose="020F0502020204030204" pitchFamily="34" charset="0"/>
-            </a:endParaRPr>
           </a:p>
         </p:txBody>
       </p:sp>
@@ -18091,9 +18531,6 @@
               </a:rPr>
               <a:t>2</a:t>
             </a:r>
-            <a:endParaRPr lang="fr-FR" sz="3200" dirty="0">
-              <a:latin typeface="Calibri" panose="020F0502020204030204" pitchFamily="34" charset="0"/>
-            </a:endParaRPr>
           </a:p>
         </p:txBody>
       </p:sp>
@@ -18131,9 +18568,6 @@
               </a:rPr>
               <a:t>[ ]</a:t>
             </a:r>
-            <a:endParaRPr lang="fr-FR" sz="3200" dirty="0">
-              <a:latin typeface="Calibri" panose="020F0502020204030204" pitchFamily="34" charset="0"/>
-            </a:endParaRPr>
           </a:p>
         </p:txBody>
       </p:sp>
@@ -18812,6 +19246,69 @@
           </a:p>
         </p:txBody>
       </p:sp>
+      <p:sp>
+        <p:nvSpPr>
+          <p:cNvPr id="31" name="ZoneTexte 30"/>
+          <p:cNvSpPr txBox="1"/>
+          <p:nvPr/>
+        </p:nvSpPr>
+        <p:spPr>
+          <a:xfrm>
+            <a:off x="8587703" y="-5917"/>
+            <a:ext cx="5154265" cy="2308324"/>
+          </a:xfrm>
+          <a:prstGeom prst="rect">
+            <a:avLst/>
+          </a:prstGeom>
+          <a:noFill/>
+        </p:spPr>
+        <p:txBody>
+          <a:bodyPr wrap="square" rtlCol="0">
+            <a:spAutoFit/>
+          </a:bodyPr>
+          <a:lstStyle/>
+          <a:p>
+            <a:r>
+              <a:rPr lang="fr-FR" sz="3600" dirty="0">
+                <a:latin typeface="Courier New" panose="02070309020205020404" pitchFamily="49" charset="0"/>
+                <a:cs typeface="Courier New" panose="02070309020205020404" pitchFamily="49" charset="0"/>
+              </a:rPr>
+              <a:t>&gt;&gt;&gt; a</a:t>
+            </a:r>
+          </a:p>
+          <a:p>
+            <a:r>
+              <a:rPr lang="fr-FR" sz="3600" dirty="0">
+                <a:latin typeface="Courier New" panose="02070309020205020404" pitchFamily="49" charset="0"/>
+                <a:cs typeface="Courier New" panose="02070309020205020404" pitchFamily="49" charset="0"/>
+              </a:rPr>
+              <a:t>[1, ['spam']]</a:t>
+            </a:r>
+          </a:p>
+          <a:p>
+            <a:r>
+              <a:rPr lang="fr-FR" sz="3600" dirty="0">
+                <a:latin typeface="Courier New" panose="02070309020205020404" pitchFamily="49" charset="0"/>
+                <a:cs typeface="Courier New" panose="02070309020205020404" pitchFamily="49" charset="0"/>
+              </a:rPr>
+              <a:t>&gt;&gt;&gt; b</a:t>
+            </a:r>
+          </a:p>
+          <a:p>
+            <a:r>
+              <a:rPr lang="fr-FR" sz="3600" dirty="0">
+                <a:latin typeface="Courier New" panose="02070309020205020404" pitchFamily="49" charset="0"/>
+                <a:cs typeface="Courier New" panose="02070309020205020404" pitchFamily="49" charset="0"/>
+              </a:rPr>
+              <a:t>[1, [2]]</a:t>
+            </a:r>
+            <a:endParaRPr lang="fr-FR" sz="3600" dirty="0">
+              <a:latin typeface="Courier New" panose="02070309020205020404" pitchFamily="49" charset="0"/>
+              <a:cs typeface="Courier New" panose="02070309020205020404" pitchFamily="49" charset="0"/>
+            </a:endParaRPr>
+          </a:p>
+        </p:txBody>
+      </p:sp>
     </p:spTree>
     <p:extLst>
       <p:ext uri="{BB962C8B-B14F-4D97-AF65-F5344CB8AC3E}">
@@ -20574,6 +21071,214 @@
                                         <p:cTn id="163" dur="500"/>
                                         <p:tgtEl>
                                           <p:spTgt spid="21"/>
+                                        </p:tgtEl>
+                                      </p:cBhvr>
+                                    </p:animEffect>
+                                  </p:childTnLst>
+                                </p:cTn>
+                              </p:par>
+                            </p:childTnLst>
+                          </p:cTn>
+                        </p:par>
+                      </p:childTnLst>
+                    </p:cTn>
+                  </p:par>
+                  <p:par>
+                    <p:cTn id="164" fill="hold">
+                      <p:stCondLst>
+                        <p:cond delay="indefinite"/>
+                      </p:stCondLst>
+                      <p:childTnLst>
+                        <p:par>
+                          <p:cTn id="165" fill="hold">
+                            <p:stCondLst>
+                              <p:cond delay="0"/>
+                            </p:stCondLst>
+                            <p:childTnLst>
+                              <p:par>
+                                <p:cTn id="166" presetID="10" presetClass="entr" presetSubtype="0" fill="hold" nodeType="clickEffect">
+                                  <p:stCondLst>
+                                    <p:cond delay="0"/>
+                                  </p:stCondLst>
+                                  <p:childTnLst>
+                                    <p:set>
+                                      <p:cBhvr>
+                                        <p:cTn id="167" dur="1" fill="hold">
+                                          <p:stCondLst>
+                                            <p:cond delay="0"/>
+                                          </p:stCondLst>
+                                        </p:cTn>
+                                        <p:tgtEl>
+                                          <p:spTgt spid="31">
+                                            <p:txEl>
+                                              <p:pRg st="0" end="0"/>
+                                            </p:txEl>
+                                          </p:spTgt>
+                                        </p:tgtEl>
+                                        <p:attrNameLst>
+                                          <p:attrName>style.visibility</p:attrName>
+                                        </p:attrNameLst>
+                                      </p:cBhvr>
+                                      <p:to>
+                                        <p:strVal val="visible"/>
+                                      </p:to>
+                                    </p:set>
+                                    <p:animEffect transition="in" filter="fade">
+                                      <p:cBhvr>
+                                        <p:cTn id="168" dur="500"/>
+                                        <p:tgtEl>
+                                          <p:spTgt spid="31">
+                                            <p:txEl>
+                                              <p:pRg st="0" end="0"/>
+                                            </p:txEl>
+                                          </p:spTgt>
+                                        </p:tgtEl>
+                                      </p:cBhvr>
+                                    </p:animEffect>
+                                  </p:childTnLst>
+                                </p:cTn>
+                              </p:par>
+                              <p:par>
+                                <p:cTn id="169" presetID="10" presetClass="entr" presetSubtype="0" fill="hold" nodeType="withEffect">
+                                  <p:stCondLst>
+                                    <p:cond delay="0"/>
+                                  </p:stCondLst>
+                                  <p:childTnLst>
+                                    <p:set>
+                                      <p:cBhvr>
+                                        <p:cTn id="170" dur="1" fill="hold">
+                                          <p:stCondLst>
+                                            <p:cond delay="0"/>
+                                          </p:stCondLst>
+                                        </p:cTn>
+                                        <p:tgtEl>
+                                          <p:spTgt spid="31">
+                                            <p:txEl>
+                                              <p:pRg st="1" end="1"/>
+                                            </p:txEl>
+                                          </p:spTgt>
+                                        </p:tgtEl>
+                                        <p:attrNameLst>
+                                          <p:attrName>style.visibility</p:attrName>
+                                        </p:attrNameLst>
+                                      </p:cBhvr>
+                                      <p:to>
+                                        <p:strVal val="visible"/>
+                                      </p:to>
+                                    </p:set>
+                                    <p:animEffect transition="in" filter="fade">
+                                      <p:cBhvr>
+                                        <p:cTn id="171" dur="500"/>
+                                        <p:tgtEl>
+                                          <p:spTgt spid="31">
+                                            <p:txEl>
+                                              <p:pRg st="1" end="1"/>
+                                            </p:txEl>
+                                          </p:spTgt>
+                                        </p:tgtEl>
+                                      </p:cBhvr>
+                                    </p:animEffect>
+                                  </p:childTnLst>
+                                </p:cTn>
+                              </p:par>
+                            </p:childTnLst>
+                          </p:cTn>
+                        </p:par>
+                      </p:childTnLst>
+                    </p:cTn>
+                  </p:par>
+                  <p:par>
+                    <p:cTn id="172" fill="hold">
+                      <p:stCondLst>
+                        <p:cond delay="indefinite"/>
+                      </p:stCondLst>
+                      <p:childTnLst>
+                        <p:par>
+                          <p:cTn id="173" fill="hold">
+                            <p:stCondLst>
+                              <p:cond delay="0"/>
+                            </p:stCondLst>
+                            <p:childTnLst>
+                              <p:par>
+                                <p:cTn id="174" presetID="10" presetClass="entr" presetSubtype="0" fill="hold" nodeType="clickEffect">
+                                  <p:stCondLst>
+                                    <p:cond delay="0"/>
+                                  </p:stCondLst>
+                                  <p:childTnLst>
+                                    <p:set>
+                                      <p:cBhvr>
+                                        <p:cTn id="175" dur="1" fill="hold">
+                                          <p:stCondLst>
+                                            <p:cond delay="0"/>
+                                          </p:stCondLst>
+                                        </p:cTn>
+                                        <p:tgtEl>
+                                          <p:spTgt spid="31">
+                                            <p:txEl>
+                                              <p:pRg st="2" end="2"/>
+                                            </p:txEl>
+                                          </p:spTgt>
+                                        </p:tgtEl>
+                                        <p:attrNameLst>
+                                          <p:attrName>style.visibility</p:attrName>
+                                        </p:attrNameLst>
+                                      </p:cBhvr>
+                                      <p:to>
+                                        <p:strVal val="visible"/>
+                                      </p:to>
+                                    </p:set>
+                                    <p:animEffect transition="in" filter="fade">
+                                      <p:cBhvr>
+                                        <p:cTn id="176" dur="500"/>
+                                        <p:tgtEl>
+                                          <p:spTgt spid="31">
+                                            <p:txEl>
+                                              <p:pRg st="2" end="2"/>
+                                            </p:txEl>
+                                          </p:spTgt>
+                                        </p:tgtEl>
+                                      </p:cBhvr>
+                                    </p:animEffect>
+                                  </p:childTnLst>
+                                </p:cTn>
+                              </p:par>
+                              <p:par>
+                                <p:cTn id="177" presetID="10" presetClass="entr" presetSubtype="0" fill="hold" nodeType="withEffect">
+                                  <p:stCondLst>
+                                    <p:cond delay="0"/>
+                                  </p:stCondLst>
+                                  <p:childTnLst>
+                                    <p:set>
+                                      <p:cBhvr>
+                                        <p:cTn id="178" dur="1" fill="hold">
+                                          <p:stCondLst>
+                                            <p:cond delay="0"/>
+                                          </p:stCondLst>
+                                        </p:cTn>
+                                        <p:tgtEl>
+                                          <p:spTgt spid="31">
+                                            <p:txEl>
+                                              <p:pRg st="3" end="3"/>
+                                            </p:txEl>
+                                          </p:spTgt>
+                                        </p:tgtEl>
+                                        <p:attrNameLst>
+                                          <p:attrName>style.visibility</p:attrName>
+                                        </p:attrNameLst>
+                                      </p:cBhvr>
+                                      <p:to>
+                                        <p:strVal val="visible"/>
+                                      </p:to>
+                                    </p:set>
+                                    <p:animEffect transition="in" filter="fade">
+                                      <p:cBhvr>
+                                        <p:cTn id="179" dur="500"/>
+                                        <p:tgtEl>
+                                          <p:spTgt spid="31">
+                                            <p:txEl>
+                                              <p:pRg st="3" end="3"/>
+                                            </p:txEl>
+                                          </p:spTgt>
                                         </p:tgtEl>
                                       </p:cBhvr>
                                     </p:animEffect>

</xml_diff>

<commit_message>
modified W3-VIDEO4 to stress the notion mutable and immutable on-going work on W7-VIDEO1
</commit_message>
<xml_diff>
--- a/semaine3/CO12AL-W3-VIDEO04-SLIDE01.pptx
+++ b/semaine3/CO12AL-W3-VIDEO04-SLIDE01.pptx
@@ -960,10 +960,6 @@
           <a:bodyPr/>
           <a:lstStyle/>
           <a:p>
-            <a:r>
-              <a:rPr lang="fr-FR" dirty="0" smtClean="0"/>
-              <a:t>(60s)</a:t>
-            </a:r>
             <a:endParaRPr lang="fr-FR" dirty="0"/>
           </a:p>
         </p:txBody>
@@ -1061,7 +1057,11 @@
           <a:p>
             <a:r>
               <a:rPr lang="fr-FR" dirty="0" smtClean="0"/>
-              <a:t>(60s)</a:t>
+              <a:t>Références partagées</a:t>
+            </a:r>
+            <a:r>
+              <a:rPr lang="fr-FR" baseline="0" dirty="0" smtClean="0"/>
+              <a:t> vers un immuable, aucun problème.</a:t>
             </a:r>
             <a:endParaRPr lang="fr-FR" dirty="0"/>
           </a:p>
@@ -1160,7 +1160,23 @@
           <a:p>
             <a:r>
               <a:rPr lang="fr-FR" dirty="0" smtClean="0"/>
-              <a:t>(60s)</a:t>
+              <a:t>Les références partagées </a:t>
+            </a:r>
+            <a:r>
+              <a:rPr lang="fr-FR" smtClean="0"/>
+              <a:t>ne posent </a:t>
+            </a:r>
+            <a:r>
+              <a:rPr lang="fr-FR" dirty="0" smtClean="0"/>
+              <a:t>problème qu’avec les</a:t>
+            </a:r>
+            <a:r>
+              <a:rPr lang="fr-FR" baseline="0" dirty="0" smtClean="0"/>
+              <a:t> </a:t>
+            </a:r>
+            <a:r>
+              <a:rPr lang="fr-FR" baseline="0" smtClean="0"/>
+              <a:t>objets mutables</a:t>
             </a:r>
             <a:endParaRPr lang="fr-FR" dirty="0"/>
           </a:p>
@@ -9465,10 +9481,6 @@
               </a:rPr>
               <a:t>['spam', 2]</a:t>
             </a:r>
-            <a:endParaRPr lang="fr-FR" sz="3600" dirty="0">
-              <a:latin typeface="Courier New" panose="02070309020205020404" pitchFamily="49" charset="0"/>
-              <a:cs typeface="Courier New" panose="02070309020205020404" pitchFamily="49" charset="0"/>
-            </a:endParaRPr>
           </a:p>
         </p:txBody>
       </p:sp>
@@ -11663,14 +11675,7 @@
                 <a:latin typeface="Courier New" panose="02070309020205020404" pitchFamily="49" charset="0"/>
                 <a:cs typeface="Courier New" panose="02070309020205020404" pitchFamily="49" charset="0"/>
               </a:rPr>
-              <a:t>&gt;&gt;&gt; a[0] = </a:t>
-            </a:r>
-            <a:r>
-              <a:rPr lang="fr-FR" sz="3600" dirty="0" smtClean="0">
-                <a:latin typeface="Courier New" panose="02070309020205020404" pitchFamily="49" charset="0"/>
-                <a:cs typeface="Courier New" panose="02070309020205020404" pitchFamily="49" charset="0"/>
-              </a:rPr>
-              <a:t>'spam'</a:t>
+              <a:t>&gt;&gt;&gt; a[0] = 'spam'</a:t>
             </a:r>
           </a:p>
           <a:p>
@@ -14407,10 +14412,6 @@
               </a:rPr>
               <a:t>[1, ['spam']]</a:t>
             </a:r>
-            <a:endParaRPr lang="fr-FR" sz="3600" dirty="0">
-              <a:latin typeface="Courier New" panose="02070309020205020404" pitchFamily="49" charset="0"/>
-              <a:cs typeface="Courier New" panose="02070309020205020404" pitchFamily="49" charset="0"/>
-            </a:endParaRPr>
           </a:p>
         </p:txBody>
       </p:sp>
@@ -19302,10 +19303,6 @@
               </a:rPr>
               <a:t>[1, [2]]</a:t>
             </a:r>
-            <a:endParaRPr lang="fr-FR" sz="3600" dirty="0">
-              <a:latin typeface="Courier New" panose="02070309020205020404" pitchFamily="49" charset="0"/>
-              <a:cs typeface="Courier New" panose="02070309020205020404" pitchFamily="49" charset="0"/>
-            </a:endParaRPr>
           </a:p>
         </p:txBody>
       </p:sp>

</xml_diff>

<commit_message>
took into account most xxx and XXX comments from Thierry
</commit_message>
<xml_diff>
--- a/semaine3/CO12AL-W3-VIDEO04-SLIDE01.pptx
+++ b/semaine3/CO12AL-W3-VIDEO04-SLIDE01.pptx
@@ -1061,7 +1061,11 @@
             </a:r>
             <a:r>
               <a:rPr lang="fr-FR" baseline="0" dirty="0" smtClean="0"/>
-              <a:t> vers un immuable, aucun problème.</a:t>
+              <a:t> vers un immuable, </a:t>
+            </a:r>
+            <a:r>
+              <a:rPr lang="fr-FR" baseline="0" dirty="0" smtClean="0"/>
+              <a:t>aucune difficulté.</a:t>
             </a:r>
             <a:endParaRPr lang="fr-FR" dirty="0"/>
           </a:p>
@@ -1160,15 +1164,19 @@
           <a:p>
             <a:r>
               <a:rPr lang="fr-FR" dirty="0" smtClean="0"/>
-              <a:t>Les références partagées </a:t>
+              <a:t>Les références </a:t>
             </a:r>
             <a:r>
               <a:rPr lang="fr-FR" smtClean="0"/>
-              <a:t>ne posent </a:t>
+              <a:t>partagées ne présente </a:t>
             </a:r>
             <a:r>
               <a:rPr lang="fr-FR" dirty="0" smtClean="0"/>
-              <a:t>problème qu’avec les</a:t>
+              <a:t>une difficulté </a:t>
+            </a:r>
+            <a:r>
+              <a:rPr lang="fr-FR" dirty="0" smtClean="0"/>
+              <a:t>qu’avec les</a:t>
             </a:r>
             <a:r>
               <a:rPr lang="fr-FR" baseline="0" dirty="0" smtClean="0"/>
@@ -1176,9 +1184,13 @@
             </a:r>
             <a:r>
               <a:rPr lang="fr-FR" baseline="0" smtClean="0"/>
-              <a:t>objets mutables</a:t>
+              <a:t>objets </a:t>
             </a:r>
-            <a:endParaRPr lang="fr-FR" dirty="0"/>
+            <a:r>
+              <a:rPr lang="fr-FR" baseline="0" smtClean="0"/>
+              <a:t>mutables.</a:t>
+            </a:r>
+            <a:endParaRPr lang="fr-FR" baseline="0" dirty="0" smtClean="0"/>
           </a:p>
         </p:txBody>
       </p:sp>

</xml_diff>